<commit_message>
changed rating image from 1-5 to 1-4
</commit_message>
<xml_diff>
--- a/stimuli_new.pptx
+++ b/stimuli_new.pptx
@@ -137,6 +137,22 @@
       </a:defRPr>
     </a:lvl9pPr>
   </p:defaultTextStyle>
+  <p:extLst>
+    <p:ext uri="{EFAFB233-063F-42B5-8137-9DF3F51BA10A}">
+      <p15:sldGuideLst xmlns:p15="http://schemas.microsoft.com/office/powerpoint/2012/main">
+        <p15:guide id="1" orient="horz" pos="2160">
+          <p15:clr>
+            <a:srgbClr val="A4A3A4"/>
+          </p15:clr>
+        </p15:guide>
+        <p15:guide id="2" pos="2880">
+          <p15:clr>
+            <a:srgbClr val="A4A3A4"/>
+          </p15:clr>
+        </p15:guide>
+      </p15:sldGuideLst>
+    </p:ext>
+  </p:extLst>
 </p:presentation>
 </file>
 
@@ -331,7 +347,7 @@
               <a:pPr>
                 <a:defRPr/>
               </a:pPr>
-              <a:t>1/6/12</a:t>
+              <a:t>1/10/18</a:t>
             </a:fld>
             <a:endParaRPr lang="en-US"/>
           </a:p>
@@ -523,7 +539,7 @@
               <a:pPr>
                 <a:defRPr/>
               </a:pPr>
-              <a:t>1/6/12</a:t>
+              <a:t>1/10/18</a:t>
             </a:fld>
             <a:endParaRPr lang="en-US"/>
           </a:p>
@@ -725,7 +741,7 @@
               <a:pPr>
                 <a:defRPr/>
               </a:pPr>
-              <a:t>1/6/12</a:t>
+              <a:t>1/10/18</a:t>
             </a:fld>
             <a:endParaRPr lang="en-US"/>
           </a:p>
@@ -917,7 +933,7 @@
               <a:pPr>
                 <a:defRPr/>
               </a:pPr>
-              <a:t>1/6/12</a:t>
+              <a:t>1/10/18</a:t>
             </a:fld>
             <a:endParaRPr lang="en-US"/>
           </a:p>
@@ -1185,7 +1201,7 @@
               <a:pPr>
                 <a:defRPr/>
               </a:pPr>
-              <a:t>1/6/12</a:t>
+              <a:t>1/10/18</a:t>
             </a:fld>
             <a:endParaRPr lang="en-US"/>
           </a:p>
@@ -1495,7 +1511,7 @@
               <a:pPr>
                 <a:defRPr/>
               </a:pPr>
-              <a:t>1/6/12</a:t>
+              <a:t>1/10/18</a:t>
             </a:fld>
             <a:endParaRPr lang="en-US"/>
           </a:p>
@@ -1939,7 +1955,7 @@
               <a:pPr>
                 <a:defRPr/>
               </a:pPr>
-              <a:t>1/6/12</a:t>
+              <a:t>1/10/18</a:t>
             </a:fld>
             <a:endParaRPr lang="en-US"/>
           </a:p>
@@ -2079,7 +2095,7 @@
               <a:pPr>
                 <a:defRPr/>
               </a:pPr>
-              <a:t>1/6/12</a:t>
+              <a:t>1/10/18</a:t>
             </a:fld>
             <a:endParaRPr lang="en-US"/>
           </a:p>
@@ -2196,7 +2212,7 @@
               <a:pPr>
                 <a:defRPr/>
               </a:pPr>
-              <a:t>1/6/12</a:t>
+              <a:t>1/10/18</a:t>
             </a:fld>
             <a:endParaRPr lang="en-US"/>
           </a:p>
@@ -2495,7 +2511,7 @@
               <a:pPr>
                 <a:defRPr/>
               </a:pPr>
-              <a:t>1/6/12</a:t>
+              <a:t>1/10/18</a:t>
             </a:fld>
             <a:endParaRPr lang="en-US"/>
           </a:p>
@@ -2777,7 +2793,7 @@
               <a:pPr>
                 <a:defRPr/>
               </a:pPr>
-              <a:t>1/6/12</a:t>
+              <a:t>1/10/18</a:t>
             </a:fld>
             <a:endParaRPr lang="en-US"/>
           </a:p>
@@ -3034,7 +3050,7 @@
               <a:pPr>
                 <a:defRPr/>
               </a:pPr>
-              <a:t>1/6/12</a:t>
+              <a:t>1/10/18</a:t>
             </a:fld>
             <a:endParaRPr lang="en-US"/>
           </a:p>
@@ -3854,8 +3870,8 @@
         </p:nvSpPr>
         <p:spPr bwMode="auto">
           <a:xfrm>
-            <a:off x="1200150" y="4316413"/>
-            <a:ext cx="6745288" cy="701675"/>
+            <a:off x="1022787" y="4316413"/>
+            <a:ext cx="7100021" cy="707886"/>
           </a:xfrm>
           <a:prstGeom prst="rect">
             <a:avLst/>
@@ -3879,11 +3895,44 @@
           <a:p>
             <a:pPr algn="ctr"/>
             <a:r>
-              <a:rPr lang="en-US" sz="4000">
+              <a:rPr lang="en-US" sz="4000" dirty="0">
                 <a:latin typeface="Calibri" pitchFamily="-72" charset="0"/>
               </a:rPr>
-              <a:t>1 ------- 2 ------- 3 ------- 4 ------- 5</a:t>
-            </a:r>
+              <a:t>1 </a:t>
+            </a:r>
+            <a:r>
+              <a:rPr lang="en-US" sz="4000" dirty="0" smtClean="0">
+                <a:latin typeface="Calibri" pitchFamily="-72" charset="0"/>
+              </a:rPr>
+              <a:t>----------- </a:t>
+            </a:r>
+            <a:r>
+              <a:rPr lang="en-US" sz="4000" dirty="0">
+                <a:latin typeface="Calibri" pitchFamily="-72" charset="0"/>
+              </a:rPr>
+              <a:t>2 </a:t>
+            </a:r>
+            <a:r>
+              <a:rPr lang="en-US" sz="4000" dirty="0">
+                <a:latin typeface="Calibri" pitchFamily="-72" charset="0"/>
+              </a:rPr>
+              <a:t>----------- </a:t>
+            </a:r>
+            <a:r>
+              <a:rPr lang="en-US" sz="4000" dirty="0">
+                <a:latin typeface="Calibri" pitchFamily="-72" charset="0"/>
+              </a:rPr>
+              <a:t>3 </a:t>
+            </a:r>
+            <a:r>
+              <a:rPr lang="en-US" sz="4000" dirty="0">
+                <a:latin typeface="Calibri" pitchFamily="-72" charset="0"/>
+              </a:rPr>
+              <a:t>----------- 4</a:t>
+            </a:r>
+            <a:endParaRPr lang="en-US" sz="4000" dirty="0">
+              <a:latin typeface="Calibri" pitchFamily="-72" charset="0"/>
+            </a:endParaRPr>
           </a:p>
         </p:txBody>
       </p:sp>

</xml_diff>